<commit_message>
uml/misc: fix overlapping lines
</commit_message>
<xml_diff>
--- a/diagrams/uml/misc/objectVsClassDiagrams/professorStudent.pptx
+++ b/diagrams/uml/misc/objectVsClassDiagrams/professorStudent.pptx
@@ -104,6 +104,22 @@
       </a:defRPr>
     </a:lvl9pPr>
   </p:defaultTextStyle>
+  <p:extLst>
+    <p:ext uri="{EFAFB233-063F-42B5-8137-9DF3F51BA10A}">
+      <p15:sldGuideLst xmlns:p15="http://schemas.microsoft.com/office/powerpoint/2012/main">
+        <p15:guide id="1" orient="horz" pos="2160">
+          <p15:clr>
+            <a:srgbClr val="A4A3A4"/>
+          </p15:clr>
+        </p15:guide>
+        <p15:guide id="2" pos="2880">
+          <p15:clr>
+            <a:srgbClr val="A4A3A4"/>
+          </p15:clr>
+        </p15:guide>
+      </p15:sldGuideLst>
+    </p:ext>
+  </p:extLst>
 </p:presentation>
 </file>
 
@@ -288,7 +304,7 @@
           <a:p>
             <a:fld id="{4FB10ECC-AC5B-49AB-A034-9A8058FE697D}" type="datetimeFigureOut">
               <a:rPr lang="en-SG" smtClean="0"/>
-              <a:t>8/6/2017</a:t>
+              <a:t>31/8/2019</a:t>
             </a:fld>
             <a:endParaRPr lang="en-SG"/>
           </a:p>
@@ -458,7 +474,7 @@
           <a:p>
             <a:fld id="{4FB10ECC-AC5B-49AB-A034-9A8058FE697D}" type="datetimeFigureOut">
               <a:rPr lang="en-SG" smtClean="0"/>
-              <a:t>8/6/2017</a:t>
+              <a:t>31/8/2019</a:t>
             </a:fld>
             <a:endParaRPr lang="en-SG"/>
           </a:p>
@@ -638,7 +654,7 @@
           <a:p>
             <a:fld id="{4FB10ECC-AC5B-49AB-A034-9A8058FE697D}" type="datetimeFigureOut">
               <a:rPr lang="en-SG" smtClean="0"/>
-              <a:t>8/6/2017</a:t>
+              <a:t>31/8/2019</a:t>
             </a:fld>
             <a:endParaRPr lang="en-SG"/>
           </a:p>
@@ -808,7 +824,7 @@
           <a:p>
             <a:fld id="{4FB10ECC-AC5B-49AB-A034-9A8058FE697D}" type="datetimeFigureOut">
               <a:rPr lang="en-SG" smtClean="0"/>
-              <a:t>8/6/2017</a:t>
+              <a:t>31/8/2019</a:t>
             </a:fld>
             <a:endParaRPr lang="en-SG"/>
           </a:p>
@@ -1054,7 +1070,7 @@
           <a:p>
             <a:fld id="{4FB10ECC-AC5B-49AB-A034-9A8058FE697D}" type="datetimeFigureOut">
               <a:rPr lang="en-SG" smtClean="0"/>
-              <a:t>8/6/2017</a:t>
+              <a:t>31/8/2019</a:t>
             </a:fld>
             <a:endParaRPr lang="en-SG"/>
           </a:p>
@@ -1342,7 +1358,7 @@
           <a:p>
             <a:fld id="{4FB10ECC-AC5B-49AB-A034-9A8058FE697D}" type="datetimeFigureOut">
               <a:rPr lang="en-SG" smtClean="0"/>
-              <a:t>8/6/2017</a:t>
+              <a:t>31/8/2019</a:t>
             </a:fld>
             <a:endParaRPr lang="en-SG"/>
           </a:p>
@@ -1764,7 +1780,7 @@
           <a:p>
             <a:fld id="{4FB10ECC-AC5B-49AB-A034-9A8058FE697D}" type="datetimeFigureOut">
               <a:rPr lang="en-SG" smtClean="0"/>
-              <a:t>8/6/2017</a:t>
+              <a:t>31/8/2019</a:t>
             </a:fld>
             <a:endParaRPr lang="en-SG"/>
           </a:p>
@@ -1882,7 +1898,7 @@
           <a:p>
             <a:fld id="{4FB10ECC-AC5B-49AB-A034-9A8058FE697D}" type="datetimeFigureOut">
               <a:rPr lang="en-SG" smtClean="0"/>
-              <a:t>8/6/2017</a:t>
+              <a:t>31/8/2019</a:t>
             </a:fld>
             <a:endParaRPr lang="en-SG"/>
           </a:p>
@@ -1977,7 +1993,7 @@
           <a:p>
             <a:fld id="{4FB10ECC-AC5B-49AB-A034-9A8058FE697D}" type="datetimeFigureOut">
               <a:rPr lang="en-SG" smtClean="0"/>
-              <a:t>8/6/2017</a:t>
+              <a:t>31/8/2019</a:t>
             </a:fld>
             <a:endParaRPr lang="en-SG"/>
           </a:p>
@@ -2254,7 +2270,7 @@
           <a:p>
             <a:fld id="{4FB10ECC-AC5B-49AB-A034-9A8058FE697D}" type="datetimeFigureOut">
               <a:rPr lang="en-SG" smtClean="0"/>
-              <a:t>8/6/2017</a:t>
+              <a:t>31/8/2019</a:t>
             </a:fld>
             <a:endParaRPr lang="en-SG"/>
           </a:p>
@@ -2507,7 +2523,7 @@
           <a:p>
             <a:fld id="{4FB10ECC-AC5B-49AB-A034-9A8058FE697D}" type="datetimeFigureOut">
               <a:rPr lang="en-SG" smtClean="0"/>
-              <a:t>8/6/2017</a:t>
+              <a:t>31/8/2019</a:t>
             </a:fld>
             <a:endParaRPr lang="en-SG"/>
           </a:p>
@@ -2720,7 +2736,7 @@
           <a:p>
             <a:fld id="{4FB10ECC-AC5B-49AB-A034-9A8058FE697D}" type="datetimeFigureOut">
               <a:rPr lang="en-SG" smtClean="0"/>
-              <a:t>8/6/2017</a:t>
+              <a:t>31/8/2019</a:t>
             </a:fld>
             <a:endParaRPr lang="en-SG"/>
           </a:p>
@@ -3203,20 +3219,18 @@
         <p:nvCxnSpPr>
           <p:cNvPr id="36" name="Elbow Connector 35"/>
           <p:cNvCxnSpPr>
-            <a:stCxn id="34" idx="3"/>
+            <a:stCxn id="34" idx="0"/>
             <a:endCxn id="35" idx="1"/>
           </p:cNvCxnSpPr>
           <p:nvPr/>
         </p:nvCxnSpPr>
         <p:spPr>
-          <a:xfrm flipV="1">
-            <a:off x="2269142" y="3156466"/>
-            <a:ext cx="762000" cy="316468"/>
-          </a:xfrm>
-          <a:prstGeom prst="bentConnector3">
-            <a:avLst>
-              <a:gd name="adj1" fmla="val 50000"/>
-            </a:avLst>
+          <a:xfrm rot="5400000" flipH="1" flipV="1">
+            <a:off x="2127041" y="2384167"/>
+            <a:ext cx="131802" cy="1676400"/>
+          </a:xfrm>
+          <a:prstGeom prst="bentConnector2">
+            <a:avLst/>
           </a:prstGeom>
           <a:ln>
             <a:solidFill>
@@ -3248,7 +3262,7 @@
         <p:spPr>
           <a:xfrm>
             <a:off x="2040542" y="4736068"/>
-            <a:ext cx="914400" cy="369332"/>
+            <a:ext cx="947282" cy="369332"/>
           </a:xfrm>
           <a:prstGeom prst="rect">
             <a:avLst/>
@@ -3340,12 +3354,12 @@
         </p:nvCxnSpPr>
         <p:spPr>
           <a:xfrm rot="10800000">
-            <a:off x="440342" y="4463534"/>
-            <a:ext cx="1600200" cy="457200"/>
+            <a:off x="556664" y="4463534"/>
+            <a:ext cx="1483878" cy="457200"/>
           </a:xfrm>
           <a:prstGeom prst="bentConnector3">
             <a:avLst>
-              <a:gd name="adj1" fmla="val 114286"/>
+              <a:gd name="adj1" fmla="val 115406"/>
             </a:avLst>
           </a:prstGeom>
           <a:ln>
@@ -3377,7 +3391,7 @@
         </p:nvSpPr>
         <p:spPr>
           <a:xfrm>
-            <a:off x="440342" y="4278868"/>
+            <a:off x="556664" y="4278868"/>
             <a:ext cx="1524000" cy="369332"/>
           </a:xfrm>
           <a:prstGeom prst="rect">
@@ -3578,8 +3592,8 @@
         </p:nvCxnSpPr>
         <p:spPr>
           <a:xfrm>
-            <a:off x="1964342" y="4463534"/>
-            <a:ext cx="1066800" cy="1588"/>
+            <a:off x="2080664" y="4463534"/>
+            <a:ext cx="950478" cy="12700"/>
           </a:xfrm>
           <a:prstGeom prst="bentConnector3">
             <a:avLst>
@@ -3618,12 +3632,12 @@
         </p:nvCxnSpPr>
         <p:spPr>
           <a:xfrm flipV="1">
-            <a:off x="2954942" y="4463534"/>
-            <a:ext cx="1600200" cy="457200"/>
+            <a:off x="2987824" y="4463534"/>
+            <a:ext cx="1567318" cy="457200"/>
           </a:xfrm>
           <a:prstGeom prst="bentConnector3">
             <a:avLst>
-              <a:gd name="adj1" fmla="val 114286"/>
+              <a:gd name="adj1" fmla="val 106347"/>
             </a:avLst>
           </a:prstGeom>
           <a:ln>
@@ -3658,12 +3672,12 @@
         </p:nvCxnSpPr>
         <p:spPr>
           <a:xfrm flipV="1">
-            <a:off x="2954942" y="3689866"/>
-            <a:ext cx="1600200" cy="1230868"/>
+            <a:off x="2987824" y="3689866"/>
+            <a:ext cx="1567318" cy="1230868"/>
           </a:xfrm>
           <a:prstGeom prst="bentConnector3">
             <a:avLst>
-              <a:gd name="adj1" fmla="val 114286"/>
+              <a:gd name="adj1" fmla="val 110263"/>
             </a:avLst>
           </a:prstGeom>
           <a:ln>
@@ -3698,12 +3712,12 @@
         </p:nvCxnSpPr>
         <p:spPr>
           <a:xfrm flipH="1">
-            <a:off x="2954942" y="3156466"/>
-            <a:ext cx="1600200" cy="1764268"/>
+            <a:off x="2987824" y="3156466"/>
+            <a:ext cx="1567318" cy="1764268"/>
           </a:xfrm>
           <a:prstGeom prst="bentConnector3">
             <a:avLst>
-              <a:gd name="adj1" fmla="val -14286"/>
+              <a:gd name="adj1" fmla="val -14585"/>
             </a:avLst>
           </a:prstGeom>
           <a:ln>
@@ -3986,7 +4000,7 @@
           </a:xfrm>
           <a:prstGeom prst="bentConnector3">
             <a:avLst>
-              <a:gd name="adj1" fmla="val 122936"/>
+              <a:gd name="adj1" fmla="val 114958"/>
             </a:avLst>
           </a:prstGeom>
           <a:ln>
@@ -4210,7 +4224,7 @@
           </a:xfrm>
           <a:prstGeom prst="bentConnector3">
             <a:avLst>
-              <a:gd name="adj1" fmla="val 115803"/>
+              <a:gd name="adj1" fmla="val 109592"/>
             </a:avLst>
           </a:prstGeom>
           <a:ln>

</xml_diff>

<commit_message>
uml: Tweak info on generic classes, dependencies
</commit_message>
<xml_diff>
--- a/diagrams/uml/misc/objectVsClassDiagrams/professorStudent.pptx
+++ b/diagrams/uml/misc/objectVsClassDiagrams/professorStudent.pptx
@@ -304,7 +304,7 @@
           <a:p>
             <a:fld id="{4FB10ECC-AC5B-49AB-A034-9A8058FE697D}" type="datetimeFigureOut">
               <a:rPr lang="en-SG" smtClean="0"/>
-              <a:t>31/8/2019</a:t>
+              <a:t>29/12/2020</a:t>
             </a:fld>
             <a:endParaRPr lang="en-SG"/>
           </a:p>
@@ -474,7 +474,7 @@
           <a:p>
             <a:fld id="{4FB10ECC-AC5B-49AB-A034-9A8058FE697D}" type="datetimeFigureOut">
               <a:rPr lang="en-SG" smtClean="0"/>
-              <a:t>31/8/2019</a:t>
+              <a:t>29/12/2020</a:t>
             </a:fld>
             <a:endParaRPr lang="en-SG"/>
           </a:p>
@@ -654,7 +654,7 @@
           <a:p>
             <a:fld id="{4FB10ECC-AC5B-49AB-A034-9A8058FE697D}" type="datetimeFigureOut">
               <a:rPr lang="en-SG" smtClean="0"/>
-              <a:t>31/8/2019</a:t>
+              <a:t>29/12/2020</a:t>
             </a:fld>
             <a:endParaRPr lang="en-SG"/>
           </a:p>
@@ -824,7 +824,7 @@
           <a:p>
             <a:fld id="{4FB10ECC-AC5B-49AB-A034-9A8058FE697D}" type="datetimeFigureOut">
               <a:rPr lang="en-SG" smtClean="0"/>
-              <a:t>31/8/2019</a:t>
+              <a:t>29/12/2020</a:t>
             </a:fld>
             <a:endParaRPr lang="en-SG"/>
           </a:p>
@@ -1070,7 +1070,7 @@
           <a:p>
             <a:fld id="{4FB10ECC-AC5B-49AB-A034-9A8058FE697D}" type="datetimeFigureOut">
               <a:rPr lang="en-SG" smtClean="0"/>
-              <a:t>31/8/2019</a:t>
+              <a:t>29/12/2020</a:t>
             </a:fld>
             <a:endParaRPr lang="en-SG"/>
           </a:p>
@@ -1358,7 +1358,7 @@
           <a:p>
             <a:fld id="{4FB10ECC-AC5B-49AB-A034-9A8058FE697D}" type="datetimeFigureOut">
               <a:rPr lang="en-SG" smtClean="0"/>
-              <a:t>31/8/2019</a:t>
+              <a:t>29/12/2020</a:t>
             </a:fld>
             <a:endParaRPr lang="en-SG"/>
           </a:p>
@@ -1780,7 +1780,7 @@
           <a:p>
             <a:fld id="{4FB10ECC-AC5B-49AB-A034-9A8058FE697D}" type="datetimeFigureOut">
               <a:rPr lang="en-SG" smtClean="0"/>
-              <a:t>31/8/2019</a:t>
+              <a:t>29/12/2020</a:t>
             </a:fld>
             <a:endParaRPr lang="en-SG"/>
           </a:p>
@@ -1898,7 +1898,7 @@
           <a:p>
             <a:fld id="{4FB10ECC-AC5B-49AB-A034-9A8058FE697D}" type="datetimeFigureOut">
               <a:rPr lang="en-SG" smtClean="0"/>
-              <a:t>31/8/2019</a:t>
+              <a:t>29/12/2020</a:t>
             </a:fld>
             <a:endParaRPr lang="en-SG"/>
           </a:p>
@@ -1993,7 +1993,7 @@
           <a:p>
             <a:fld id="{4FB10ECC-AC5B-49AB-A034-9A8058FE697D}" type="datetimeFigureOut">
               <a:rPr lang="en-SG" smtClean="0"/>
-              <a:t>31/8/2019</a:t>
+              <a:t>29/12/2020</a:t>
             </a:fld>
             <a:endParaRPr lang="en-SG"/>
           </a:p>
@@ -2270,7 +2270,7 @@
           <a:p>
             <a:fld id="{4FB10ECC-AC5B-49AB-A034-9A8058FE697D}" type="datetimeFigureOut">
               <a:rPr lang="en-SG" smtClean="0"/>
-              <a:t>31/8/2019</a:t>
+              <a:t>29/12/2020</a:t>
             </a:fld>
             <a:endParaRPr lang="en-SG"/>
           </a:p>
@@ -2523,7 +2523,7 @@
           <a:p>
             <a:fld id="{4FB10ECC-AC5B-49AB-A034-9A8058FE697D}" type="datetimeFigureOut">
               <a:rPr lang="en-SG" smtClean="0"/>
-              <a:t>31/8/2019</a:t>
+              <a:t>29/12/2020</a:t>
             </a:fld>
             <a:endParaRPr lang="en-SG"/>
           </a:p>
@@ -2736,7 +2736,7 @@
           <a:p>
             <a:fld id="{4FB10ECC-AC5B-49AB-A034-9A8058FE697D}" type="datetimeFigureOut">
               <a:rPr lang="en-SG" smtClean="0"/>
-              <a:t>31/8/2019</a:t>
+              <a:t>29/12/2020</a:t>
             </a:fld>
             <a:endParaRPr lang="en-SG"/>
           </a:p>
@@ -3545,15 +3545,14 @@
         <p:nvCxnSpPr>
           <p:cNvPr id="43" name="Elbow Connector 42"/>
           <p:cNvCxnSpPr>
-            <a:stCxn id="37" idx="1"/>
             <a:endCxn id="34" idx="1"/>
           </p:cNvCxnSpPr>
           <p:nvPr/>
         </p:nvCxnSpPr>
         <p:spPr>
           <a:xfrm rot="10800000">
-            <a:off x="440342" y="3472934"/>
-            <a:ext cx="1600200" cy="1447800"/>
+            <a:off x="440342" y="3472935"/>
+            <a:ext cx="1600200" cy="1592005"/>
           </a:xfrm>
           <a:prstGeom prst="bentConnector3">
             <a:avLst>
@@ -3665,7 +3664,6 @@
         <p:nvCxnSpPr>
           <p:cNvPr id="46" name="Elbow Connector 45"/>
           <p:cNvCxnSpPr>
-            <a:stCxn id="37" idx="3"/>
             <a:endCxn id="41" idx="3"/>
           </p:cNvCxnSpPr>
           <p:nvPr/>
@@ -3673,11 +3671,11 @@
         <p:spPr>
           <a:xfrm flipV="1">
             <a:off x="2987824" y="3689866"/>
-            <a:ext cx="1567318" cy="1230868"/>
+            <a:ext cx="1567318" cy="1375073"/>
           </a:xfrm>
           <a:prstGeom prst="bentConnector3">
             <a:avLst>
-              <a:gd name="adj1" fmla="val 110263"/>
+              <a:gd name="adj1" fmla="val 114585"/>
             </a:avLst>
           </a:prstGeom>
           <a:ln>
@@ -3706,18 +3704,19 @@
           <p:cNvPr id="47" name="Elbow Connector 46"/>
           <p:cNvCxnSpPr>
             <a:stCxn id="35" idx="3"/>
-            <a:endCxn id="37" idx="3"/>
+            <a:endCxn id="37" idx="2"/>
           </p:cNvCxnSpPr>
           <p:nvPr/>
         </p:nvCxnSpPr>
         <p:spPr>
           <a:xfrm flipH="1">
-            <a:off x="2987824" y="3156466"/>
-            <a:ext cx="1567318" cy="1764268"/>
-          </a:xfrm>
-          <a:prstGeom prst="bentConnector3">
+            <a:off x="2514183" y="3156466"/>
+            <a:ext cx="2040959" cy="1948934"/>
+          </a:xfrm>
+          <a:prstGeom prst="bentConnector4">
             <a:avLst>
-              <a:gd name="adj1" fmla="val -14585"/>
+              <a:gd name="adj1" fmla="val -15305"/>
+              <a:gd name="adj2" fmla="val 111729"/>
             </a:avLst>
           </a:prstGeom>
           <a:ln>
@@ -3798,7 +3797,7 @@
         </p:nvSpPr>
         <p:spPr>
           <a:xfrm>
-            <a:off x="5154627" y="3255501"/>
+            <a:off x="5414296" y="3255501"/>
             <a:ext cx="1233360" cy="353943"/>
           </a:xfrm>
           <a:prstGeom prst="rect">
@@ -3905,8 +3904,8 @@
         </p:nvCxnSpPr>
         <p:spPr>
           <a:xfrm flipV="1">
-            <a:off x="6387987" y="3431594"/>
-            <a:ext cx="786276" cy="879"/>
+            <a:off x="6647656" y="3431594"/>
+            <a:ext cx="526607" cy="879"/>
           </a:xfrm>
           <a:prstGeom prst="bentConnector3">
             <a:avLst>
@@ -3995,12 +3994,12 @@
         </p:nvCxnSpPr>
         <p:spPr>
           <a:xfrm rot="10800000">
-            <a:off x="5162719" y="4423075"/>
-            <a:ext cx="996669" cy="457199"/>
+            <a:off x="5422387" y="4423075"/>
+            <a:ext cx="737000" cy="457199"/>
           </a:xfrm>
           <a:prstGeom prst="bentConnector3">
             <a:avLst>
-              <a:gd name="adj1" fmla="val 114958"/>
+              <a:gd name="adj1" fmla="val 119653"/>
             </a:avLst>
           </a:prstGeom>
           <a:ln>
@@ -4032,7 +4031,7 @@
         </p:nvSpPr>
         <p:spPr>
           <a:xfrm>
-            <a:off x="5162718" y="4246102"/>
+            <a:off x="5422387" y="4246102"/>
             <a:ext cx="1262357" cy="353943"/>
           </a:xfrm>
           <a:prstGeom prst="rect">
@@ -4132,19 +4131,19 @@
         <p:nvCxnSpPr>
           <p:cNvPr id="56" name="Elbow Connector 55"/>
           <p:cNvCxnSpPr>
-            <a:stCxn id="52" idx="1"/>
             <a:endCxn id="49" idx="1"/>
           </p:cNvCxnSpPr>
           <p:nvPr/>
         </p:nvCxnSpPr>
         <p:spPr>
-          <a:xfrm rot="10800000">
-            <a:off x="5154627" y="3432473"/>
-            <a:ext cx="1004760" cy="1447800"/>
-          </a:xfrm>
-          <a:prstGeom prst="bentConnector3">
+          <a:xfrm rot="16200000" flipV="1">
+            <a:off x="4970609" y="3876160"/>
+            <a:ext cx="1632466" cy="745091"/>
+          </a:xfrm>
+          <a:prstGeom prst="bentConnector4">
             <a:avLst>
-              <a:gd name="adj1" fmla="val 122752"/>
+              <a:gd name="adj1" fmla="val 2677"/>
+              <a:gd name="adj2" fmla="val 130681"/>
             </a:avLst>
           </a:prstGeom>
           <a:ln>
@@ -4179,8 +4178,8 @@
         </p:nvCxnSpPr>
         <p:spPr>
           <a:xfrm flipV="1">
-            <a:off x="6425075" y="4423073"/>
-            <a:ext cx="724912" cy="1"/>
+            <a:off x="6684744" y="4423073"/>
+            <a:ext cx="465243" cy="1"/>
           </a:xfrm>
           <a:prstGeom prst="bentConnector3">
             <a:avLst>
@@ -4253,14 +4252,13 @@
           <p:cNvPr id="59" name="Elbow Connector 58"/>
           <p:cNvCxnSpPr>
             <a:stCxn id="50" idx="3"/>
-            <a:endCxn id="52" idx="3"/>
           </p:cNvCxnSpPr>
           <p:nvPr/>
         </p:nvCxnSpPr>
         <p:spPr>
           <a:xfrm flipH="1">
             <a:off x="7073787" y="3431594"/>
-            <a:ext cx="1624476" cy="1448679"/>
+            <a:ext cx="1624476" cy="1581582"/>
           </a:xfrm>
           <a:prstGeom prst="bentConnector3">
             <a:avLst>

</xml_diff>